<commit_message>
Revised ratecount results figure
</commit_message>
<xml_diff>
--- a/figs/fig_modelpipeline.pptx
+++ b/figs/fig_modelpipeline.pptx
@@ -123,12 +123,33 @@
 </p:presentation>
 </file>
 
-<file path=ppt/revisionInfo.xml><?xml version="1.0" encoding="utf-8"?>
-<p1510:revInfo xmlns:a="http://schemas.openxmlformats.org/drawingml/2006/main" xmlns:r="http://schemas.openxmlformats.org/officeDocument/2006/relationships" xmlns:p1510="http://schemas.microsoft.com/office/powerpoint/2015/10/main">
-  <p1510:revLst>
-    <p1510:client id="{0DEAF538-9A43-0041-92DF-11DEC3319B03}" v="273" dt="2025-04-28T14:11:52.456"/>
-  </p1510:revLst>
-</p1510:revInfo>
+<file path=ppt/changesInfos/changesInfo1.xml><?xml version="1.0" encoding="utf-8"?>
+<pc:chgInfo xmlns:a="http://schemas.openxmlformats.org/drawingml/2006/main" xmlns:r="http://schemas.openxmlformats.org/officeDocument/2006/relationships" xmlns:ac="http://schemas.microsoft.com/office/drawing/2013/main/command" xmlns:pc="http://schemas.microsoft.com/office/powerpoint/2013/main/command">
+  <pc:docChgLst>
+    <pc:chgData name="Barkasi, Michael" userId="604489e9-c8b5-4a18-ae0d-3a3e29c44efc" providerId="ADAL" clId="{81E79797-102E-7D4D-B6A4-F91E3FB6CD0E}"/>
+    <pc:docChg chg="modSld">
+      <pc:chgData name="Barkasi, Michael" userId="604489e9-c8b5-4a18-ae0d-3a3e29c44efc" providerId="ADAL" clId="{81E79797-102E-7D4D-B6A4-F91E3FB6CD0E}" dt="2025-05-13T15:11:05.735" v="1" actId="207"/>
+      <pc:docMkLst>
+        <pc:docMk/>
+      </pc:docMkLst>
+      <pc:sldChg chg="modSp mod">
+        <pc:chgData name="Barkasi, Michael" userId="604489e9-c8b5-4a18-ae0d-3a3e29c44efc" providerId="ADAL" clId="{81E79797-102E-7D4D-B6A4-F91E3FB6CD0E}" dt="2025-05-13T15:11:05.735" v="1" actId="207"/>
+        <pc:sldMkLst>
+          <pc:docMk/>
+          <pc:sldMk cId="1160241537" sldId="256"/>
+        </pc:sldMkLst>
+        <pc:spChg chg="mod">
+          <ac:chgData name="Barkasi, Michael" userId="604489e9-c8b5-4a18-ae0d-3a3e29c44efc" providerId="ADAL" clId="{81E79797-102E-7D4D-B6A4-F91E3FB6CD0E}" dt="2025-05-13T15:11:05.735" v="1" actId="207"/>
+          <ac:spMkLst>
+            <pc:docMk/>
+            <pc:sldMk cId="1160241537" sldId="256"/>
+            <ac:spMk id="25" creationId="{F51AFFE9-3039-D4BF-DFB0-67E60D747199}"/>
+          </ac:spMkLst>
+        </pc:spChg>
+      </pc:sldChg>
+    </pc:docChg>
+  </pc:docChgLst>
+</pc:chgInfo>
 </file>
 
 <file path=ppt/slideLayouts/slideLayout1.xml><?xml version="1.0" encoding="utf-8"?>
@@ -278,7 +299,7 @@
           <a:p>
             <a:fld id="{0671BF96-9467-0B49-AF35-7149D7F70E39}" type="datetimeFigureOut">
               <a:rPr lang="en-US" smtClean="0"/>
-              <a:t>4/27/25</a:t>
+              <a:t>5/13/25</a:t>
             </a:fld>
             <a:endParaRPr lang="en-US"/>
           </a:p>
@@ -476,7 +497,7 @@
           <a:p>
             <a:fld id="{0671BF96-9467-0B49-AF35-7149D7F70E39}" type="datetimeFigureOut">
               <a:rPr lang="en-US" smtClean="0"/>
-              <a:t>4/27/25</a:t>
+              <a:t>5/13/25</a:t>
             </a:fld>
             <a:endParaRPr lang="en-US"/>
           </a:p>
@@ -684,7 +705,7 @@
           <a:p>
             <a:fld id="{0671BF96-9467-0B49-AF35-7149D7F70E39}" type="datetimeFigureOut">
               <a:rPr lang="en-US" smtClean="0"/>
-              <a:t>4/27/25</a:t>
+              <a:t>5/13/25</a:t>
             </a:fld>
             <a:endParaRPr lang="en-US"/>
           </a:p>
@@ -882,7 +903,7 @@
           <a:p>
             <a:fld id="{0671BF96-9467-0B49-AF35-7149D7F70E39}" type="datetimeFigureOut">
               <a:rPr lang="en-US" smtClean="0"/>
-              <a:t>4/27/25</a:t>
+              <a:t>5/13/25</a:t>
             </a:fld>
             <a:endParaRPr lang="en-US"/>
           </a:p>
@@ -1157,7 +1178,7 @@
           <a:p>
             <a:fld id="{0671BF96-9467-0B49-AF35-7149D7F70E39}" type="datetimeFigureOut">
               <a:rPr lang="en-US" smtClean="0"/>
-              <a:t>4/27/25</a:t>
+              <a:t>5/13/25</a:t>
             </a:fld>
             <a:endParaRPr lang="en-US"/>
           </a:p>
@@ -1422,7 +1443,7 @@
           <a:p>
             <a:fld id="{0671BF96-9467-0B49-AF35-7149D7F70E39}" type="datetimeFigureOut">
               <a:rPr lang="en-US" smtClean="0"/>
-              <a:t>4/27/25</a:t>
+              <a:t>5/13/25</a:t>
             </a:fld>
             <a:endParaRPr lang="en-US"/>
           </a:p>
@@ -1834,7 +1855,7 @@
           <a:p>
             <a:fld id="{0671BF96-9467-0B49-AF35-7149D7F70E39}" type="datetimeFigureOut">
               <a:rPr lang="en-US" smtClean="0"/>
-              <a:t>4/27/25</a:t>
+              <a:t>5/13/25</a:t>
             </a:fld>
             <a:endParaRPr lang="en-US"/>
           </a:p>
@@ -1975,7 +1996,7 @@
           <a:p>
             <a:fld id="{0671BF96-9467-0B49-AF35-7149D7F70E39}" type="datetimeFigureOut">
               <a:rPr lang="en-US" smtClean="0"/>
-              <a:t>4/27/25</a:t>
+              <a:t>5/13/25</a:t>
             </a:fld>
             <a:endParaRPr lang="en-US"/>
           </a:p>
@@ -2088,7 +2109,7 @@
           <a:p>
             <a:fld id="{0671BF96-9467-0B49-AF35-7149D7F70E39}" type="datetimeFigureOut">
               <a:rPr lang="en-US" smtClean="0"/>
-              <a:t>4/27/25</a:t>
+              <a:t>5/13/25</a:t>
             </a:fld>
             <a:endParaRPr lang="en-US"/>
           </a:p>
@@ -2399,7 +2420,7 @@
           <a:p>
             <a:fld id="{0671BF96-9467-0B49-AF35-7149D7F70E39}" type="datetimeFigureOut">
               <a:rPr lang="en-US" smtClean="0"/>
-              <a:t>4/27/25</a:t>
+              <a:t>5/13/25</a:t>
             </a:fld>
             <a:endParaRPr lang="en-US"/>
           </a:p>
@@ -2687,7 +2708,7 @@
           <a:p>
             <a:fld id="{0671BF96-9467-0B49-AF35-7149D7F70E39}" type="datetimeFigureOut">
               <a:rPr lang="en-US" smtClean="0"/>
-              <a:t>4/27/25</a:t>
+              <a:t>5/13/25</a:t>
             </a:fld>
             <a:endParaRPr lang="en-US"/>
           </a:p>
@@ -2930,7 +2951,7 @@
             <a:fld id="{0671BF96-9467-0B49-AF35-7149D7F70E39}" type="datetimeFigureOut">
               <a:rPr lang="en-US" smtClean="0"/>
               <a:pPr/>
-              <a:t>4/27/25</a:t>
+              <a:t>5/13/25</a:t>
             </a:fld>
             <a:endParaRPr lang="en-US" dirty="0"/>
           </a:p>
@@ -4760,12 +4781,17 @@
           <a:prstGeom prst="rect">
             <a:avLst/>
           </a:prstGeom>
-          <a:solidFill>
-            <a:schemeClr val="accent2">
-              <a:lumMod val="40000"/>
-              <a:lumOff val="60000"/>
-            </a:schemeClr>
-          </a:solidFill>
+          <a:pattFill prst="wdUpDiag">
+            <a:fgClr>
+              <a:schemeClr val="accent2">
+                <a:lumMod val="40000"/>
+                <a:lumOff val="60000"/>
+              </a:schemeClr>
+            </a:fgClr>
+            <a:bgClr>
+              <a:schemeClr val="bg1"/>
+            </a:bgClr>
+          </a:pattFill>
           <a:ln>
             <a:solidFill>
               <a:schemeClr val="tx1"/>
@@ -7894,8 +7920,8 @@
           </a:p>
         </p:txBody>
       </p:sp>
-      <mc:AlternateContent xmlns:mc="http://schemas.openxmlformats.org/markup-compatibility/2006">
-        <mc:Choice xmlns:a14="http://schemas.microsoft.com/office/drawing/2010/main" Requires="a14">
+      <mc:AlternateContent xmlns:mc="http://schemas.openxmlformats.org/markup-compatibility/2006" xmlns:a14="http://schemas.microsoft.com/office/drawing/2010/main">
+        <mc:Choice Requires="a14">
           <p:sp>
             <p:nvSpPr>
               <p:cNvPr id="376" name="TextBox 375">
@@ -7953,7 +7979,7 @@
             </p:txBody>
           </p:sp>
         </mc:Choice>
-        <mc:Fallback>
+        <mc:Fallback xmlns="">
           <p:sp>
             <p:nvSpPr>
               <p:cNvPr id="376" name="TextBox 375">
@@ -7998,8 +8024,8 @@
           </p:sp>
         </mc:Fallback>
       </mc:AlternateContent>
-      <mc:AlternateContent xmlns:mc="http://schemas.openxmlformats.org/markup-compatibility/2006">
-        <mc:Choice xmlns:a14="http://schemas.microsoft.com/office/drawing/2010/main" Requires="a14">
+      <mc:AlternateContent xmlns:mc="http://schemas.openxmlformats.org/markup-compatibility/2006" xmlns:a14="http://schemas.microsoft.com/office/drawing/2010/main">
+        <mc:Choice Requires="a14">
           <p:sp>
             <p:nvSpPr>
               <p:cNvPr id="378" name="TextBox 377">
@@ -8057,7 +8083,7 @@
             </p:txBody>
           </p:sp>
         </mc:Choice>
-        <mc:Fallback>
+        <mc:Fallback xmlns="">
           <p:sp>
             <p:nvSpPr>
               <p:cNvPr id="378" name="TextBox 377">
@@ -8102,8 +8128,8 @@
           </p:sp>
         </mc:Fallback>
       </mc:AlternateContent>
-      <mc:AlternateContent xmlns:mc="http://schemas.openxmlformats.org/markup-compatibility/2006">
-        <mc:Choice xmlns:a14="http://schemas.microsoft.com/office/drawing/2010/main" Requires="a14">
+      <mc:AlternateContent xmlns:mc="http://schemas.openxmlformats.org/markup-compatibility/2006" xmlns:a14="http://schemas.microsoft.com/office/drawing/2010/main">
+        <mc:Choice Requires="a14">
           <p:sp>
             <p:nvSpPr>
               <p:cNvPr id="380" name="TextBox 379">
@@ -8182,7 +8208,7 @@
             </p:txBody>
           </p:sp>
         </mc:Choice>
-        <mc:Fallback>
+        <mc:Fallback xmlns="">
           <p:sp>
             <p:nvSpPr>
               <p:cNvPr id="380" name="TextBox 379">
@@ -8227,8 +8253,8 @@
           </p:sp>
         </mc:Fallback>
       </mc:AlternateContent>
-      <mc:AlternateContent xmlns:mc="http://schemas.openxmlformats.org/markup-compatibility/2006">
-        <mc:Choice xmlns:a14="http://schemas.microsoft.com/office/drawing/2010/main" Requires="a14">
+      <mc:AlternateContent xmlns:mc="http://schemas.openxmlformats.org/markup-compatibility/2006" xmlns:a14="http://schemas.microsoft.com/office/drawing/2010/main">
+        <mc:Choice Requires="a14">
           <p:sp>
             <p:nvSpPr>
               <p:cNvPr id="382" name="TextBox 381">
@@ -8286,7 +8312,7 @@
             </p:txBody>
           </p:sp>
         </mc:Choice>
-        <mc:Fallback>
+        <mc:Fallback xmlns="">
           <p:sp>
             <p:nvSpPr>
               <p:cNvPr id="382" name="TextBox 381">
@@ -8331,8 +8357,8 @@
           </p:sp>
         </mc:Fallback>
       </mc:AlternateContent>
-      <mc:AlternateContent xmlns:mc="http://schemas.openxmlformats.org/markup-compatibility/2006">
-        <mc:Choice xmlns:a14="http://schemas.microsoft.com/office/drawing/2010/main" Requires="a14">
+      <mc:AlternateContent xmlns:mc="http://schemas.openxmlformats.org/markup-compatibility/2006" xmlns:a14="http://schemas.microsoft.com/office/drawing/2010/main">
+        <mc:Choice Requires="a14">
           <p:sp>
             <p:nvSpPr>
               <p:cNvPr id="384" name="TextBox 383">
@@ -8390,7 +8416,7 @@
             </p:txBody>
           </p:sp>
         </mc:Choice>
-        <mc:Fallback>
+        <mc:Fallback xmlns="">
           <p:sp>
             <p:nvSpPr>
               <p:cNvPr id="384" name="TextBox 383">
@@ -8435,8 +8461,8 @@
           </p:sp>
         </mc:Fallback>
       </mc:AlternateContent>
-      <mc:AlternateContent xmlns:mc="http://schemas.openxmlformats.org/markup-compatibility/2006">
-        <mc:Choice xmlns:a14="http://schemas.microsoft.com/office/drawing/2010/main" Requires="a14">
+      <mc:AlternateContent xmlns:mc="http://schemas.openxmlformats.org/markup-compatibility/2006" xmlns:a14="http://schemas.microsoft.com/office/drawing/2010/main">
+        <mc:Choice Requires="a14">
           <p:sp>
             <p:nvSpPr>
               <p:cNvPr id="386" name="TextBox 385">
@@ -8494,7 +8520,7 @@
             </p:txBody>
           </p:sp>
         </mc:Choice>
-        <mc:Fallback>
+        <mc:Fallback xmlns="">
           <p:sp>
             <p:nvSpPr>
               <p:cNvPr id="386" name="TextBox 385">
@@ -8599,8 +8625,8 @@
           </a:p>
         </p:txBody>
       </p:sp>
-      <mc:AlternateContent xmlns:mc="http://schemas.openxmlformats.org/markup-compatibility/2006">
-        <mc:Choice xmlns:a14="http://schemas.microsoft.com/office/drawing/2010/main" Requires="a14">
+      <mc:AlternateContent xmlns:mc="http://schemas.openxmlformats.org/markup-compatibility/2006" xmlns:a14="http://schemas.microsoft.com/office/drawing/2010/main">
+        <mc:Choice Requires="a14">
           <p:sp>
             <p:nvSpPr>
               <p:cNvPr id="388" name="TextBox 387">
@@ -8658,7 +8684,7 @@
             </p:txBody>
           </p:sp>
         </mc:Choice>
-        <mc:Fallback>
+        <mc:Fallback xmlns="">
           <p:sp>
             <p:nvSpPr>
               <p:cNvPr id="388" name="TextBox 387">
@@ -8763,8 +8789,8 @@
           </a:p>
         </p:txBody>
       </p:sp>
-      <mc:AlternateContent xmlns:mc="http://schemas.openxmlformats.org/markup-compatibility/2006">
-        <mc:Choice xmlns:a14="http://schemas.microsoft.com/office/drawing/2010/main" Requires="a14">
+      <mc:AlternateContent xmlns:mc="http://schemas.openxmlformats.org/markup-compatibility/2006" xmlns:a14="http://schemas.microsoft.com/office/drawing/2010/main">
+        <mc:Choice Requires="a14">
           <p:sp>
             <p:nvSpPr>
               <p:cNvPr id="391" name="TextBox 390">
@@ -8822,7 +8848,7 @@
             </p:txBody>
           </p:sp>
         </mc:Choice>
-        <mc:Fallback>
+        <mc:Fallback xmlns="">
           <p:sp>
             <p:nvSpPr>
               <p:cNvPr id="391" name="TextBox 390">
@@ -8930,8 +8956,8 @@
           </a:p>
         </p:txBody>
       </p:sp>
-      <mc:AlternateContent xmlns:mc="http://schemas.openxmlformats.org/markup-compatibility/2006">
-        <mc:Choice xmlns:a14="http://schemas.microsoft.com/office/drawing/2010/main" Requires="a14">
+      <mc:AlternateContent xmlns:mc="http://schemas.openxmlformats.org/markup-compatibility/2006" xmlns:a14="http://schemas.microsoft.com/office/drawing/2010/main">
+        <mc:Choice Requires="a14">
           <p:sp>
             <p:nvSpPr>
               <p:cNvPr id="392" name="TextBox 391">
@@ -9014,7 +9040,7 @@
             </p:txBody>
           </p:sp>
         </mc:Choice>
-        <mc:Fallback>
+        <mc:Fallback xmlns="">
           <p:sp>
             <p:nvSpPr>
               <p:cNvPr id="392" name="TextBox 391">

</xml_diff>